<commit_message>
! fix places: "openFileOutput", "openFileInput"
</commit_message>
<xml_diff>
--- a/lessions/Android_Par04_SharePreference_File.pptx
+++ b/lessions/Android_Par04_SharePreference_File.pptx
@@ -371,6 +371,11 @@
         </p:txBody>
       </p:sp>
     </p:spTree>
+    <p:extLst>
+      <p:ext uri="{BB962C8B-B14F-4D97-AF65-F5344CB8AC3E}">
+        <p14:creationId xmlns:p14="http://schemas.microsoft.com/office/powerpoint/2010/main" val="1639532310"/>
+      </p:ext>
+    </p:extLst>
   </p:cSld>
   <p:clrMap bg1="lt1" tx1="dk1" bg2="lt2" tx2="dk2" accent1="accent1" accent2="accent2" accent3="accent3" accent4="accent4" accent5="accent5" accent6="accent6" hlink="hlink" folHlink="folHlink"/>
 </p:handoutMaster>
@@ -497,7 +502,7 @@
         <p:nvSpPr>
           <p:cNvPr id="13316" name="Rectangle 4"/>
           <p:cNvSpPr>
-            <a:spLocks noGrp="1" noRot="1" noChangeArrowheads="1" noTextEdit="1"/>
+            <a:spLocks noGrp="1" noRot="1" noChangeAspect="1" noChangeArrowheads="1" noTextEdit="1"/>
           </p:cNvSpPr>
           <p:nvPr>
             <p:ph type="sldImg" idx="2"/>
@@ -693,6 +698,11 @@
         </p:txBody>
       </p:sp>
     </p:spTree>
+    <p:extLst>
+      <p:ext uri="{BB962C8B-B14F-4D97-AF65-F5344CB8AC3E}">
+        <p14:creationId xmlns:p14="http://schemas.microsoft.com/office/powerpoint/2010/main" val="1493193642"/>
+      </p:ext>
+    </p:extLst>
   </p:cSld>
   <p:clrMap bg1="lt1" tx1="dk1" bg2="lt2" tx2="dk2" accent1="accent1" accent2="accent2" accent3="accent3" accent4="accent4" accent5="accent5" accent6="accent6" hlink="hlink" folHlink="folHlink"/>
   <p:notesStyle>
@@ -867,7 +877,7 @@
         <p:nvSpPr>
           <p:cNvPr id="16386" name="Rectangle 2"/>
           <p:cNvSpPr>
-            <a:spLocks noGrp="1" noRot="1" noChangeArrowheads="1" noTextEdit="1"/>
+            <a:spLocks noGrp="1" noRot="1" noChangeAspect="1" noChangeArrowheads="1" noTextEdit="1"/>
           </p:cNvSpPr>
           <p:nvPr>
             <p:ph type="sldImg"/>
@@ -2096,7 +2106,7 @@
               <a:pPr>
                 <a:defRPr/>
               </a:pPr>
-              <a:t>14/10/2011</a:t>
+              <a:t>02/05/2012</a:t>
             </a:fld>
             <a:endParaRPr lang="en-US"/>
           </a:p>
@@ -2264,7 +2274,7 @@
               <a:pPr>
                 <a:defRPr/>
               </a:pPr>
-              <a:t>14/10/2011</a:t>
+              <a:t>02/05/2012</a:t>
             </a:fld>
             <a:endParaRPr lang="en-US"/>
           </a:p>
@@ -2475,7 +2485,7 @@
               <a:pPr>
                 <a:defRPr/>
               </a:pPr>
-              <a:t>14/10/2011</a:t>
+              <a:t>02/05/2012</a:t>
             </a:fld>
             <a:endParaRPr lang="en-US"/>
           </a:p>
@@ -2676,7 +2686,7 @@
               <a:pPr>
                 <a:defRPr/>
               </a:pPr>
-              <a:t>14/10/2011</a:t>
+              <a:t>02/05/2012</a:t>
             </a:fld>
             <a:endParaRPr lang="en-US"/>
           </a:p>
@@ -2899,7 +2909,7 @@
               <a:pPr>
                 <a:defRPr/>
               </a:pPr>
-              <a:t>14/10/2011</a:t>
+              <a:t>02/05/2012</a:t>
             </a:fld>
             <a:endParaRPr lang="en-US"/>
           </a:p>
@@ -3218,7 +3228,7 @@
               <a:pPr>
                 <a:defRPr/>
               </a:pPr>
-              <a:t>14/10/2011</a:t>
+              <a:t>02/05/2012</a:t>
             </a:fld>
             <a:endParaRPr lang="en-US"/>
           </a:p>
@@ -3676,7 +3686,7 @@
               <a:pPr>
                 <a:defRPr/>
               </a:pPr>
-              <a:t>14/10/2011</a:t>
+              <a:t>02/05/2012</a:t>
             </a:fld>
             <a:endParaRPr lang="en-US"/>
           </a:p>
@@ -3825,7 +3835,7 @@
               <a:pPr>
                 <a:defRPr/>
               </a:pPr>
-              <a:t>14/10/2011</a:t>
+              <a:t>02/05/2012</a:t>
             </a:fld>
             <a:endParaRPr lang="en-US"/>
           </a:p>
@@ -3951,7 +3961,7 @@
               <a:pPr>
                 <a:defRPr/>
               </a:pPr>
-              <a:t>14/10/2011</a:t>
+              <a:t>02/05/2012</a:t>
             </a:fld>
             <a:endParaRPr lang="en-US"/>
           </a:p>
@@ -4259,7 +4269,7 @@
               <a:pPr>
                 <a:defRPr/>
               </a:pPr>
-              <a:t>14/10/2011</a:t>
+              <a:t>02/05/2012</a:t>
             </a:fld>
             <a:endParaRPr lang="en-US"/>
           </a:p>
@@ -4544,7 +4554,7 @@
               <a:pPr>
                 <a:defRPr/>
               </a:pPr>
-              <a:t>14/10/2011</a:t>
+              <a:t>02/05/2012</a:t>
             </a:fld>
             <a:endParaRPr lang="en-US"/>
           </a:p>
@@ -5110,7 +5120,7 @@
               <a:pPr>
                 <a:defRPr/>
               </a:pPr>
-              <a:t>14/10/2011</a:t>
+              <a:t>02/05/2012</a:t>
             </a:fld>
             <a:endParaRPr lang="en-US"/>
           </a:p>
@@ -5735,7 +5745,7 @@
             <a:fld id="{241F7588-58C6-49C4-820B-9016416EFF42}" type="datetime1">
               <a:rPr lang="vi-VN" smtClean="0"/>
               <a:pPr/>
-              <a:t>14/10/2011</a:t>
+              <a:t>02/05/2012</a:t>
             </a:fld>
             <a:endParaRPr lang="en-US" smtClean="0"/>
           </a:p>
@@ -6125,7 +6135,7 @@
         </p:spPr>
         <p:txBody>
           <a:bodyPr>
-            <a:normAutofit/>
+            <a:normAutofit lnSpcReduction="10000"/>
           </a:bodyPr>
           <a:lstStyle/>
           <a:p>
@@ -6494,7 +6504,7 @@
             <a:fld id="{94CBAA49-1234-47B7-8499-9A2BF400079F}" type="datetime1">
               <a:rPr lang="vi-VN" smtClean="0"/>
               <a:pPr/>
-              <a:t>14/10/2011</a:t>
+              <a:t>02/05/2012</a:t>
             </a:fld>
             <a:endParaRPr lang="en-US" smtClean="0"/>
           </a:p>
@@ -6650,7 +6660,7 @@
             <a:fld id="{5AA7324B-C4C5-42D4-B6F3-47DB83C4FA24}" type="datetime1">
               <a:rPr lang="vi-VN" smtClean="0"/>
               <a:pPr/>
-              <a:t>14/10/2011</a:t>
+              <a:t>02/05/2012</a:t>
             </a:fld>
             <a:endParaRPr lang="en-US" smtClean="0"/>
           </a:p>
@@ -7098,7 +7108,7 @@
             <a:pPr lvl="1"/>
             <a:r>
               <a:rPr lang="en-US" sz="1400" smtClean="0">
-                <a:hlinkClick r:id="rId3"/>
+                <a:hlinkClick r:id="rId2"/>
               </a:rPr>
               <a:t>MODE_WORLD_READABLE</a:t>
             </a:r>
@@ -7108,7 +7118,7 @@
             <a:pPr lvl="1"/>
             <a:r>
               <a:rPr lang="en-US" sz="1400" smtClean="0">
-                <a:hlinkClick r:id="rId4"/>
+                <a:hlinkClick r:id="rId2"/>
               </a:rPr>
               <a:t>MODE_WORLD_WRITEABLE</a:t>
             </a:r>
@@ -7118,7 +7128,7 @@
             <a:pPr lvl="1"/>
             <a:r>
               <a:rPr lang="en-US" sz="1400" smtClean="0">
-                <a:hlinkClick r:id="rId5"/>
+                <a:hlinkClick r:id="rId2"/>
               </a:rPr>
               <a:t>MODE_MULTI_PROCESS</a:t>
             </a:r>
@@ -7517,9 +7527,210 @@
               </a:lnSpc>
             </a:pPr>
             <a:r>
-              <a:rPr lang="en-US" sz="2000" smtClean="0"/>
-              <a:t>Khi ứng dụng được cài đặt, hệ thống cung cấp 1 vùng bộ nhớ trong dành cho việc lưu trữ dữ liệu cho mỗi ứng dụng riêng</a:t>
-            </a:r>
+              <a:rPr lang="en-US" sz="2000" dirty="0" err="1" smtClean="0"/>
+              <a:t>Khi</a:t>
+            </a:r>
+            <a:r>
+              <a:rPr lang="en-US" sz="2000" dirty="0" smtClean="0"/>
+              <a:t> </a:t>
+            </a:r>
+            <a:r>
+              <a:rPr lang="en-US" sz="2000" dirty="0" err="1" smtClean="0"/>
+              <a:t>ứng</a:t>
+            </a:r>
+            <a:r>
+              <a:rPr lang="en-US" sz="2000" dirty="0" smtClean="0"/>
+              <a:t> </a:t>
+            </a:r>
+            <a:r>
+              <a:rPr lang="en-US" sz="2000" dirty="0" err="1" smtClean="0"/>
+              <a:t>dụng</a:t>
+            </a:r>
+            <a:r>
+              <a:rPr lang="en-US" sz="2000" dirty="0" smtClean="0"/>
+              <a:t> </a:t>
+            </a:r>
+            <a:r>
+              <a:rPr lang="en-US" sz="2000" dirty="0" err="1" smtClean="0"/>
+              <a:t>được</a:t>
+            </a:r>
+            <a:r>
+              <a:rPr lang="en-US" sz="2000" dirty="0" smtClean="0"/>
+              <a:t> </a:t>
+            </a:r>
+            <a:r>
+              <a:rPr lang="en-US" sz="2000" dirty="0" err="1" smtClean="0"/>
+              <a:t>cài</a:t>
+            </a:r>
+            <a:r>
+              <a:rPr lang="en-US" sz="2000" dirty="0" smtClean="0"/>
+              <a:t> </a:t>
+            </a:r>
+            <a:r>
+              <a:rPr lang="en-US" sz="2000" dirty="0" err="1" smtClean="0"/>
+              <a:t>đặt</a:t>
+            </a:r>
+            <a:r>
+              <a:rPr lang="en-US" sz="2000" dirty="0" smtClean="0"/>
+              <a:t>, </a:t>
+            </a:r>
+            <a:r>
+              <a:rPr lang="en-US" sz="2000" dirty="0" err="1" smtClean="0"/>
+              <a:t>hệ</a:t>
+            </a:r>
+            <a:r>
+              <a:rPr lang="en-US" sz="2000" dirty="0" smtClean="0"/>
+              <a:t> </a:t>
+            </a:r>
+            <a:r>
+              <a:rPr lang="en-US" sz="2000" dirty="0" err="1" smtClean="0"/>
+              <a:t>thống</a:t>
+            </a:r>
+            <a:r>
+              <a:rPr lang="en-US" sz="2000" dirty="0" smtClean="0"/>
+              <a:t> </a:t>
+            </a:r>
+            <a:r>
+              <a:rPr lang="en-US" sz="2000" dirty="0" err="1" smtClean="0"/>
+              <a:t>cung</a:t>
+            </a:r>
+            <a:r>
+              <a:rPr lang="en-US" sz="2000" dirty="0" smtClean="0"/>
+              <a:t> </a:t>
+            </a:r>
+            <a:r>
+              <a:rPr lang="en-US" sz="2000" dirty="0" err="1" smtClean="0"/>
+              <a:t>cấp</a:t>
+            </a:r>
+            <a:r>
+              <a:rPr lang="en-US" sz="2000" dirty="0" smtClean="0"/>
+              <a:t> 1 </a:t>
+            </a:r>
+            <a:r>
+              <a:rPr lang="en-US" sz="2000" dirty="0" err="1" smtClean="0"/>
+              <a:t>vùng</a:t>
+            </a:r>
+            <a:r>
+              <a:rPr lang="en-US" sz="2000" dirty="0" smtClean="0"/>
+              <a:t> </a:t>
+            </a:r>
+            <a:r>
+              <a:rPr lang="en-US" sz="2000" dirty="0" err="1" smtClean="0"/>
+              <a:t>bộ</a:t>
+            </a:r>
+            <a:r>
+              <a:rPr lang="en-US" sz="2000" dirty="0" smtClean="0"/>
+              <a:t> </a:t>
+            </a:r>
+            <a:r>
+              <a:rPr lang="en-US" sz="2000" dirty="0" err="1" smtClean="0"/>
+              <a:t>nhớ</a:t>
+            </a:r>
+            <a:r>
+              <a:rPr lang="en-US" sz="2000" dirty="0" smtClean="0"/>
+              <a:t> </a:t>
+            </a:r>
+            <a:r>
+              <a:rPr lang="en-US" sz="2000" dirty="0" err="1" smtClean="0"/>
+              <a:t>trong</a:t>
+            </a:r>
+            <a:r>
+              <a:rPr lang="en-US" sz="2000" dirty="0" smtClean="0"/>
+              <a:t> </a:t>
+            </a:r>
+            <a:r>
+              <a:rPr lang="en-US" sz="2000" dirty="0" err="1" smtClean="0"/>
+              <a:t>dành</a:t>
+            </a:r>
+            <a:r>
+              <a:rPr lang="en-US" sz="2000" dirty="0" smtClean="0"/>
+              <a:t> </a:t>
+            </a:r>
+            <a:r>
+              <a:rPr lang="en-US" sz="2000" dirty="0" err="1" smtClean="0"/>
+              <a:t>cho</a:t>
+            </a:r>
+            <a:r>
+              <a:rPr lang="en-US" sz="2000" dirty="0" smtClean="0"/>
+              <a:t> </a:t>
+            </a:r>
+            <a:r>
+              <a:rPr lang="en-US" sz="2000" dirty="0" err="1" smtClean="0"/>
+              <a:t>việc</a:t>
+            </a:r>
+            <a:r>
+              <a:rPr lang="en-US" sz="2000" dirty="0" smtClean="0"/>
+              <a:t> </a:t>
+            </a:r>
+            <a:r>
+              <a:rPr lang="en-US" sz="2000" dirty="0" err="1" smtClean="0"/>
+              <a:t>lưu</a:t>
+            </a:r>
+            <a:r>
+              <a:rPr lang="en-US" sz="2000" dirty="0" smtClean="0"/>
+              <a:t> </a:t>
+            </a:r>
+            <a:r>
+              <a:rPr lang="en-US" sz="2000" dirty="0" err="1" smtClean="0"/>
+              <a:t>trữ</a:t>
+            </a:r>
+            <a:r>
+              <a:rPr lang="en-US" sz="2000" dirty="0" smtClean="0"/>
+              <a:t> </a:t>
+            </a:r>
+            <a:r>
+              <a:rPr lang="en-US" sz="2000" dirty="0" err="1" smtClean="0"/>
+              <a:t>dữ</a:t>
+            </a:r>
+            <a:r>
+              <a:rPr lang="en-US" sz="2000" dirty="0" smtClean="0"/>
+              <a:t> </a:t>
+            </a:r>
+            <a:r>
+              <a:rPr lang="en-US" sz="2000" dirty="0" err="1" smtClean="0"/>
+              <a:t>liệu</a:t>
+            </a:r>
+            <a:r>
+              <a:rPr lang="en-US" sz="2000" dirty="0" smtClean="0"/>
+              <a:t> </a:t>
+            </a:r>
+            <a:r>
+              <a:rPr lang="en-US" sz="2000" dirty="0" err="1" smtClean="0"/>
+              <a:t>cho</a:t>
+            </a:r>
+            <a:r>
+              <a:rPr lang="en-US" sz="2000" dirty="0" smtClean="0"/>
+              <a:t> </a:t>
+            </a:r>
+            <a:r>
+              <a:rPr lang="en-US" sz="2000" dirty="0" err="1" smtClean="0"/>
+              <a:t>mỗi</a:t>
+            </a:r>
+            <a:r>
+              <a:rPr lang="en-US" sz="2000" dirty="0" smtClean="0"/>
+              <a:t> </a:t>
+            </a:r>
+            <a:r>
+              <a:rPr lang="en-US" sz="2000" dirty="0" err="1" smtClean="0"/>
+              <a:t>ứng</a:t>
+            </a:r>
+            <a:r>
+              <a:rPr lang="en-US" sz="2000" dirty="0" smtClean="0"/>
+              <a:t> </a:t>
+            </a:r>
+            <a:r>
+              <a:rPr lang="en-US" sz="2000" dirty="0" err="1" smtClean="0"/>
+              <a:t>dụng</a:t>
+            </a:r>
+            <a:r>
+              <a:rPr lang="en-US" sz="2000" dirty="0" smtClean="0"/>
+              <a:t> </a:t>
+            </a:r>
+            <a:r>
+              <a:rPr lang="en-US" sz="2000" dirty="0" err="1" smtClean="0"/>
+              <a:t>riêng</a:t>
+            </a:r>
+            <a:endParaRPr lang="en-US" sz="2000" dirty="0" smtClean="0"/>
           </a:p>
           <a:p>
             <a:pPr marL="457200" indent="-457200">
@@ -7528,8 +7739,116 @@
               </a:lnSpc>
             </a:pPr>
             <a:r>
-              <a:rPr lang="en-US" sz="2000" smtClean="0"/>
-              <a:t>Khi người dùng gỡ bỏ ứng dụng, vùng bộ nhớ này sẽ được xóa.</a:t>
+              <a:rPr lang="en-US" sz="2000" dirty="0" err="1" smtClean="0"/>
+              <a:t>Khi</a:t>
+            </a:r>
+            <a:r>
+              <a:rPr lang="en-US" sz="2000" dirty="0" smtClean="0"/>
+              <a:t> </a:t>
+            </a:r>
+            <a:r>
+              <a:rPr lang="en-US" sz="2000" dirty="0" err="1" smtClean="0"/>
+              <a:t>người</a:t>
+            </a:r>
+            <a:r>
+              <a:rPr lang="en-US" sz="2000" dirty="0" smtClean="0"/>
+              <a:t> </a:t>
+            </a:r>
+            <a:r>
+              <a:rPr lang="en-US" sz="2000" dirty="0" err="1" smtClean="0"/>
+              <a:t>dùng</a:t>
+            </a:r>
+            <a:r>
+              <a:rPr lang="en-US" sz="2000" dirty="0" smtClean="0"/>
+              <a:t> </a:t>
+            </a:r>
+            <a:r>
+              <a:rPr lang="en-US" sz="2000" dirty="0" err="1" smtClean="0"/>
+              <a:t>gỡ</a:t>
+            </a:r>
+            <a:r>
+              <a:rPr lang="en-US" sz="2000" dirty="0" smtClean="0"/>
+              <a:t> </a:t>
+            </a:r>
+            <a:r>
+              <a:rPr lang="en-US" sz="2000" dirty="0" err="1" smtClean="0"/>
+              <a:t>bỏ</a:t>
+            </a:r>
+            <a:r>
+              <a:rPr lang="en-US" sz="2000" dirty="0" smtClean="0"/>
+              <a:t> </a:t>
+            </a:r>
+            <a:r>
+              <a:rPr lang="en-US" sz="2000" dirty="0" err="1" smtClean="0"/>
+              <a:t>ứng</a:t>
+            </a:r>
+            <a:r>
+              <a:rPr lang="en-US" sz="2000" dirty="0" smtClean="0"/>
+              <a:t> </a:t>
+            </a:r>
+            <a:r>
+              <a:rPr lang="en-US" sz="2000" dirty="0" err="1" smtClean="0"/>
+              <a:t>dụng</a:t>
+            </a:r>
+            <a:r>
+              <a:rPr lang="en-US" sz="2000" dirty="0" smtClean="0"/>
+              <a:t>, </a:t>
+            </a:r>
+            <a:r>
+              <a:rPr lang="en-US" sz="2000" dirty="0" err="1" smtClean="0"/>
+              <a:t>vùng</a:t>
+            </a:r>
+            <a:r>
+              <a:rPr lang="en-US" sz="2000" dirty="0" smtClean="0"/>
+              <a:t> </a:t>
+            </a:r>
+            <a:r>
+              <a:rPr lang="en-US" sz="2000" dirty="0" err="1" smtClean="0"/>
+              <a:t>bộ</a:t>
+            </a:r>
+            <a:r>
+              <a:rPr lang="en-US" sz="2000" dirty="0" smtClean="0"/>
+              <a:t> </a:t>
+            </a:r>
+            <a:r>
+              <a:rPr lang="en-US" sz="2000" dirty="0" err="1" smtClean="0"/>
+              <a:t>nhớ</a:t>
+            </a:r>
+            <a:r>
+              <a:rPr lang="en-US" sz="2000" dirty="0" smtClean="0"/>
+              <a:t> </a:t>
+            </a:r>
+            <a:r>
+              <a:rPr lang="en-US" sz="2000" dirty="0" err="1" smtClean="0"/>
+              <a:t>này</a:t>
+            </a:r>
+            <a:r>
+              <a:rPr lang="en-US" sz="2000" dirty="0" smtClean="0"/>
+              <a:t> </a:t>
+            </a:r>
+            <a:r>
+              <a:rPr lang="en-US" sz="2000" dirty="0" err="1" smtClean="0"/>
+              <a:t>sẽ</a:t>
+            </a:r>
+            <a:r>
+              <a:rPr lang="en-US" sz="2000" dirty="0" smtClean="0"/>
+              <a:t> </a:t>
+            </a:r>
+            <a:r>
+              <a:rPr lang="en-US" sz="2000" dirty="0" err="1" smtClean="0"/>
+              <a:t>được</a:t>
+            </a:r>
+            <a:r>
+              <a:rPr lang="en-US" sz="2000" dirty="0" smtClean="0"/>
+              <a:t> </a:t>
+            </a:r>
+            <a:r>
+              <a:rPr lang="en-US" sz="2000" dirty="0" err="1" smtClean="0"/>
+              <a:t>xóa</a:t>
+            </a:r>
+            <a:r>
+              <a:rPr lang="en-US" sz="2000" dirty="0" smtClean="0"/>
+              <a:t>.</a:t>
             </a:r>
           </a:p>
           <a:p>
@@ -7539,9 +7858,50 @@
               </a:lnSpc>
             </a:pPr>
             <a:r>
-              <a:rPr lang="en-US" sz="2000" smtClean="0"/>
-              <a:t>Tạo và lưu trữ file vào bộ lưu trữ trong</a:t>
-            </a:r>
+              <a:rPr lang="en-US" sz="2000" dirty="0" err="1"/>
+              <a:t>Đọc</a:t>
+            </a:r>
+            <a:r>
+              <a:rPr lang="en-US" sz="2000" dirty="0"/>
+              <a:t> file </a:t>
+            </a:r>
+            <a:r>
+              <a:rPr lang="en-US" sz="2000" dirty="0" err="1"/>
+              <a:t>từ</a:t>
+            </a:r>
+            <a:r>
+              <a:rPr lang="en-US" sz="2000" dirty="0"/>
+              <a:t> </a:t>
+            </a:r>
+            <a:r>
+              <a:rPr lang="en-US" sz="2000" dirty="0" err="1"/>
+              <a:t>bộ</a:t>
+            </a:r>
+            <a:r>
+              <a:rPr lang="en-US" sz="2000" dirty="0"/>
+              <a:t> </a:t>
+            </a:r>
+            <a:r>
+              <a:rPr lang="en-US" sz="2000" dirty="0" err="1"/>
+              <a:t>lưu</a:t>
+            </a:r>
+            <a:r>
+              <a:rPr lang="en-US" sz="2000" dirty="0"/>
+              <a:t> </a:t>
+            </a:r>
+            <a:r>
+              <a:rPr lang="en-US" sz="2000" dirty="0" err="1"/>
+              <a:t>trữ</a:t>
+            </a:r>
+            <a:r>
+              <a:rPr lang="en-US" sz="2000" dirty="0"/>
+              <a:t> </a:t>
+            </a:r>
+            <a:r>
+              <a:rPr lang="en-US" sz="2000" dirty="0" err="1" smtClean="0"/>
+              <a:t>trong</a:t>
+            </a:r>
+            <a:endParaRPr lang="en-US" sz="2000" dirty="0" smtClean="0"/>
           </a:p>
           <a:p>
             <a:pPr lvl="1">
@@ -7552,8 +7912,76 @@
               <a:buChar char="q"/>
             </a:pPr>
             <a:r>
-              <a:rPr lang="en-US" sz="1800" smtClean="0"/>
-              <a:t>Gọi openFileOutput() với tên file và chế độ truy cập file</a:t>
+              <a:rPr lang="en-US" sz="1800" dirty="0" err="1" smtClean="0"/>
+              <a:t>Gọi</a:t>
+            </a:r>
+            <a:r>
+              <a:rPr lang="en-US" sz="1800" dirty="0" smtClean="0"/>
+              <a:t> </a:t>
+            </a:r>
+            <a:r>
+              <a:rPr lang="en-US" sz="1800" dirty="0" err="1" smtClean="0"/>
+              <a:t>openFileOutput</a:t>
+            </a:r>
+            <a:r>
+              <a:rPr lang="en-US" sz="1800" dirty="0" smtClean="0"/>
+              <a:t>() </a:t>
+            </a:r>
+            <a:r>
+              <a:rPr lang="en-US" sz="1800" dirty="0" err="1" smtClean="0"/>
+              <a:t>với</a:t>
+            </a:r>
+            <a:r>
+              <a:rPr lang="en-US" sz="1800" dirty="0" smtClean="0"/>
+              <a:t> </a:t>
+            </a:r>
+            <a:r>
+              <a:rPr lang="en-US" sz="1800" dirty="0" err="1" smtClean="0"/>
+              <a:t>tên</a:t>
+            </a:r>
+            <a:r>
+              <a:rPr lang="en-US" sz="1800" dirty="0" smtClean="0"/>
+              <a:t> file </a:t>
+            </a:r>
+            <a:r>
+              <a:rPr lang="en-US" sz="1800" dirty="0" err="1" smtClean="0"/>
+              <a:t>và</a:t>
+            </a:r>
+            <a:r>
+              <a:rPr lang="en-US" sz="1800" dirty="0" smtClean="0"/>
+              <a:t> </a:t>
+            </a:r>
+            <a:r>
+              <a:rPr lang="en-US" sz="1800" dirty="0" err="1" smtClean="0"/>
+              <a:t>chế</a:t>
+            </a:r>
+            <a:r>
+              <a:rPr lang="en-US" sz="1800" dirty="0" smtClean="0"/>
+              <a:t> </a:t>
+            </a:r>
+            <a:r>
+              <a:rPr lang="en-US" sz="1800" dirty="0" err="1" smtClean="0"/>
+              <a:t>độ</a:t>
+            </a:r>
+            <a:r>
+              <a:rPr lang="en-US" sz="1800" dirty="0" smtClean="0"/>
+              <a:t> </a:t>
+            </a:r>
+            <a:r>
+              <a:rPr lang="en-US" sz="1800" dirty="0" err="1" smtClean="0"/>
+              <a:t>truy</a:t>
+            </a:r>
+            <a:r>
+              <a:rPr lang="en-US" sz="1800" dirty="0" smtClean="0"/>
+              <a:t> </a:t>
+            </a:r>
+            <a:r>
+              <a:rPr lang="en-US" sz="1800" dirty="0" err="1" smtClean="0"/>
+              <a:t>cập</a:t>
+            </a:r>
+            <a:r>
+              <a:rPr lang="en-US" sz="1800" dirty="0" smtClean="0"/>
+              <a:t> file</a:t>
             </a:r>
           </a:p>
           <a:p>
@@ -7565,8 +7993,52 @@
               <a:buChar char="q"/>
             </a:pPr>
             <a:r>
-              <a:rPr lang="en-US" sz="1800" smtClean="0"/>
-              <a:t>Ghi lên file sử dụng phương thức write()</a:t>
+              <a:rPr lang="en-US" sz="1800" dirty="0" err="1" smtClean="0"/>
+              <a:t>Ghi</a:t>
+            </a:r>
+            <a:r>
+              <a:rPr lang="en-US" sz="1800" dirty="0" smtClean="0"/>
+              <a:t> </a:t>
+            </a:r>
+            <a:r>
+              <a:rPr lang="en-US" sz="1800" dirty="0" err="1" smtClean="0"/>
+              <a:t>lên</a:t>
+            </a:r>
+            <a:r>
+              <a:rPr lang="en-US" sz="1800" dirty="0" smtClean="0"/>
+              <a:t> file </a:t>
+            </a:r>
+            <a:r>
+              <a:rPr lang="en-US" sz="1800" dirty="0" err="1" smtClean="0"/>
+              <a:t>sử</a:t>
+            </a:r>
+            <a:r>
+              <a:rPr lang="en-US" sz="1800" dirty="0" smtClean="0"/>
+              <a:t> </a:t>
+            </a:r>
+            <a:r>
+              <a:rPr lang="en-US" sz="1800" dirty="0" err="1" smtClean="0"/>
+              <a:t>dụng</a:t>
+            </a:r>
+            <a:r>
+              <a:rPr lang="en-US" sz="1800" dirty="0" smtClean="0"/>
+              <a:t> </a:t>
+            </a:r>
+            <a:r>
+              <a:rPr lang="en-US" sz="1800" dirty="0" err="1" smtClean="0"/>
+              <a:t>phương</a:t>
+            </a:r>
+            <a:r>
+              <a:rPr lang="en-US" sz="1800" dirty="0" smtClean="0"/>
+              <a:t> </a:t>
+            </a:r>
+            <a:r>
+              <a:rPr lang="en-US" sz="1800" dirty="0" err="1" smtClean="0"/>
+              <a:t>thức</a:t>
+            </a:r>
+            <a:r>
+              <a:rPr lang="en-US" sz="1800" dirty="0" smtClean="0"/>
+              <a:t> write()</a:t>
             </a:r>
           </a:p>
           <a:p>
@@ -7578,8 +8050,36 @@
               <a:buChar char="q"/>
             </a:pPr>
             <a:r>
-              <a:rPr lang="en-US" sz="1800" smtClean="0"/>
-              <a:t>Đóng stream với phương thức close()</a:t>
+              <a:rPr lang="en-US" sz="1800" dirty="0" err="1" smtClean="0"/>
+              <a:t>Đóng</a:t>
+            </a:r>
+            <a:r>
+              <a:rPr lang="en-US" sz="1800" dirty="0" smtClean="0"/>
+              <a:t> stream </a:t>
+            </a:r>
+            <a:r>
+              <a:rPr lang="en-US" sz="1800" dirty="0" err="1" smtClean="0"/>
+              <a:t>với</a:t>
+            </a:r>
+            <a:r>
+              <a:rPr lang="en-US" sz="1800" dirty="0" smtClean="0"/>
+              <a:t> </a:t>
+            </a:r>
+            <a:r>
+              <a:rPr lang="en-US" sz="1800" dirty="0" err="1" smtClean="0"/>
+              <a:t>phương</a:t>
+            </a:r>
+            <a:r>
+              <a:rPr lang="en-US" sz="1800" dirty="0" smtClean="0"/>
+              <a:t> </a:t>
+            </a:r>
+            <a:r>
+              <a:rPr lang="en-US" sz="1800" dirty="0" err="1" smtClean="0"/>
+              <a:t>thức</a:t>
+            </a:r>
+            <a:r>
+              <a:rPr lang="en-US" sz="1800" dirty="0" smtClean="0"/>
+              <a:t> close()</a:t>
             </a:r>
           </a:p>
           <a:p>
@@ -7589,9 +8089,74 @@
               </a:lnSpc>
             </a:pPr>
             <a:r>
-              <a:rPr lang="en-US" sz="2000" smtClean="0"/>
-              <a:t>Đọc file từ bộ lưu trữ trong </a:t>
-            </a:r>
+              <a:rPr lang="en-US" sz="2000" dirty="0" err="1" smtClean="0"/>
+              <a:t>Tạo</a:t>
+            </a:r>
+            <a:r>
+              <a:rPr lang="en-US" sz="2000" dirty="0" smtClean="0"/>
+              <a:t> </a:t>
+            </a:r>
+            <a:r>
+              <a:rPr lang="en-US" sz="2000" dirty="0" err="1"/>
+              <a:t>và</a:t>
+            </a:r>
+            <a:r>
+              <a:rPr lang="en-US" sz="2000" dirty="0"/>
+              <a:t> </a:t>
+            </a:r>
+            <a:r>
+              <a:rPr lang="en-US" sz="2000" dirty="0" err="1"/>
+              <a:t>lưu</a:t>
+            </a:r>
+            <a:r>
+              <a:rPr lang="en-US" sz="2000" dirty="0"/>
+              <a:t> </a:t>
+            </a:r>
+            <a:r>
+              <a:rPr lang="en-US" sz="2000" dirty="0" err="1"/>
+              <a:t>trữ</a:t>
+            </a:r>
+            <a:r>
+              <a:rPr lang="en-US" sz="2000" dirty="0"/>
+              <a:t> file </a:t>
+            </a:r>
+            <a:r>
+              <a:rPr lang="en-US" sz="2000" dirty="0" err="1"/>
+              <a:t>vào</a:t>
+            </a:r>
+            <a:r>
+              <a:rPr lang="en-US" sz="2000" dirty="0"/>
+              <a:t> </a:t>
+            </a:r>
+            <a:r>
+              <a:rPr lang="en-US" sz="2000" dirty="0" err="1"/>
+              <a:t>bộ</a:t>
+            </a:r>
+            <a:r>
+              <a:rPr lang="en-US" sz="2000" dirty="0"/>
+              <a:t> </a:t>
+            </a:r>
+            <a:r>
+              <a:rPr lang="en-US" sz="2000" dirty="0" err="1"/>
+              <a:t>lưu</a:t>
+            </a:r>
+            <a:r>
+              <a:rPr lang="en-US" sz="2000" dirty="0"/>
+              <a:t> </a:t>
+            </a:r>
+            <a:r>
+              <a:rPr lang="en-US" sz="2000" dirty="0" err="1"/>
+              <a:t>trữ</a:t>
+            </a:r>
+            <a:r>
+              <a:rPr lang="en-US" sz="2000" dirty="0"/>
+              <a:t> </a:t>
+            </a:r>
+            <a:r>
+              <a:rPr lang="en-US" sz="2000" dirty="0" err="1"/>
+              <a:t>trong</a:t>
+            </a:r>
+            <a:endParaRPr lang="en-US" sz="2000" dirty="0" smtClean="0"/>
           </a:p>
           <a:p>
             <a:pPr lvl="1">
@@ -7602,9 +8167,50 @@
               <a:buChar char="q"/>
             </a:pPr>
             <a:r>
-              <a:rPr lang="en-US" sz="1800" smtClean="0"/>
-              <a:t>Gọi openFileInput() với tên file cần đọc</a:t>
-            </a:r>
+              <a:rPr lang="en-US" sz="1800" dirty="0" err="1" smtClean="0"/>
+              <a:t>Gọi</a:t>
+            </a:r>
+            <a:r>
+              <a:rPr lang="en-US" sz="1800" dirty="0" smtClean="0"/>
+              <a:t> </a:t>
+            </a:r>
+            <a:r>
+              <a:rPr lang="en-US" sz="1800" dirty="0" err="1" smtClean="0"/>
+              <a:t>openFileInput</a:t>
+            </a:r>
+            <a:r>
+              <a:rPr lang="en-US" sz="1800" dirty="0" smtClean="0"/>
+              <a:t>() </a:t>
+            </a:r>
+            <a:r>
+              <a:rPr lang="en-US" sz="1800" dirty="0" err="1" smtClean="0"/>
+              <a:t>với</a:t>
+            </a:r>
+            <a:r>
+              <a:rPr lang="en-US" sz="1800" dirty="0" smtClean="0"/>
+              <a:t> </a:t>
+            </a:r>
+            <a:r>
+              <a:rPr lang="en-US" sz="1800" dirty="0" err="1" smtClean="0"/>
+              <a:t>tên</a:t>
+            </a:r>
+            <a:r>
+              <a:rPr lang="en-US" sz="1800" dirty="0" smtClean="0"/>
+              <a:t> file </a:t>
+            </a:r>
+            <a:r>
+              <a:rPr lang="en-US" sz="1800" dirty="0" err="1" smtClean="0"/>
+              <a:t>cần</a:t>
+            </a:r>
+            <a:r>
+              <a:rPr lang="en-US" sz="1800" dirty="0" smtClean="0"/>
+              <a:t> </a:t>
+            </a:r>
+            <a:r>
+              <a:rPr lang="en-US" sz="1800" dirty="0" err="1" smtClean="0"/>
+              <a:t>đọc</a:t>
+            </a:r>
+            <a:endParaRPr lang="en-US" sz="1800" dirty="0" smtClean="0"/>
           </a:p>
           <a:p>
             <a:pPr lvl="1">
@@ -7615,8 +8221,68 @@
               <a:buChar char="q"/>
             </a:pPr>
             <a:r>
-              <a:rPr lang="en-US" sz="1800" smtClean="0"/>
-              <a:t>Đọc nội dụng từ file sử dụng phương thức read()</a:t>
+              <a:rPr lang="en-US" sz="1800" dirty="0" err="1" smtClean="0"/>
+              <a:t>Đọc</a:t>
+            </a:r>
+            <a:r>
+              <a:rPr lang="en-US" sz="1800" dirty="0" smtClean="0"/>
+              <a:t> </a:t>
+            </a:r>
+            <a:r>
+              <a:rPr lang="en-US" sz="1800" dirty="0" err="1" smtClean="0"/>
+              <a:t>nội</a:t>
+            </a:r>
+            <a:r>
+              <a:rPr lang="en-US" sz="1800" dirty="0" smtClean="0"/>
+              <a:t> </a:t>
+            </a:r>
+            <a:r>
+              <a:rPr lang="en-US" sz="1800" dirty="0" err="1" smtClean="0"/>
+              <a:t>dụng</a:t>
+            </a:r>
+            <a:r>
+              <a:rPr lang="en-US" sz="1800" dirty="0" smtClean="0"/>
+              <a:t> </a:t>
+            </a:r>
+            <a:r>
+              <a:rPr lang="en-US" sz="1800" dirty="0" err="1" smtClean="0"/>
+              <a:t>từ</a:t>
+            </a:r>
+            <a:r>
+              <a:rPr lang="en-US" sz="1800" dirty="0" smtClean="0"/>
+              <a:t> file </a:t>
+            </a:r>
+            <a:r>
+              <a:rPr lang="en-US" sz="1800" dirty="0" err="1" smtClean="0"/>
+              <a:t>sử</a:t>
+            </a:r>
+            <a:r>
+              <a:rPr lang="en-US" sz="1800" dirty="0" smtClean="0"/>
+              <a:t> </a:t>
+            </a:r>
+            <a:r>
+              <a:rPr lang="en-US" sz="1800" dirty="0" err="1" smtClean="0"/>
+              <a:t>dụng</a:t>
+            </a:r>
+            <a:r>
+              <a:rPr lang="en-US" sz="1800" dirty="0" smtClean="0"/>
+              <a:t> </a:t>
+            </a:r>
+            <a:r>
+              <a:rPr lang="en-US" sz="1800" dirty="0" err="1" smtClean="0"/>
+              <a:t>phương</a:t>
+            </a:r>
+            <a:r>
+              <a:rPr lang="en-US" sz="1800" dirty="0" smtClean="0"/>
+              <a:t> </a:t>
+            </a:r>
+            <a:r>
+              <a:rPr lang="en-US" sz="1800" dirty="0" err="1" smtClean="0"/>
+              <a:t>thức</a:t>
+            </a:r>
+            <a:r>
+              <a:rPr lang="en-US" sz="1800" dirty="0" smtClean="0"/>
+              <a:t> read()</a:t>
             </a:r>
           </a:p>
           <a:p>
@@ -7628,13 +8294,41 @@
               <a:buChar char="q"/>
             </a:pPr>
             <a:r>
-              <a:rPr lang="en-US" sz="1800" smtClean="0"/>
-              <a:t>Đóng stream với phương thức close()</a:t>
+              <a:rPr lang="en-US" sz="1800" dirty="0" err="1" smtClean="0"/>
+              <a:t>Đóng</a:t>
+            </a:r>
+            <a:r>
+              <a:rPr lang="en-US" sz="1800" dirty="0" smtClean="0"/>
+              <a:t> stream </a:t>
+            </a:r>
+            <a:r>
+              <a:rPr lang="en-US" sz="1800" dirty="0" err="1" smtClean="0"/>
+              <a:t>với</a:t>
+            </a:r>
+            <a:r>
+              <a:rPr lang="en-US" sz="1800" dirty="0" smtClean="0"/>
+              <a:t> </a:t>
+            </a:r>
+            <a:r>
+              <a:rPr lang="en-US" sz="1800" dirty="0" err="1" smtClean="0"/>
+              <a:t>phương</a:t>
+            </a:r>
+            <a:r>
+              <a:rPr lang="en-US" sz="1800" dirty="0" smtClean="0"/>
+              <a:t> </a:t>
+            </a:r>
+            <a:r>
+              <a:rPr lang="en-US" sz="1800" dirty="0" err="1" smtClean="0"/>
+              <a:t>thức</a:t>
+            </a:r>
+            <a:r>
+              <a:rPr lang="en-US" sz="1800" dirty="0" smtClean="0"/>
+              <a:t> close()</a:t>
             </a:r>
             <a:br>
-              <a:rPr lang="en-US" sz="1800" smtClean="0"/>
+              <a:rPr lang="en-US" sz="1800" dirty="0" smtClean="0"/>
             </a:br>
-            <a:endParaRPr lang="en-US" sz="1800" smtClean="0"/>
+            <a:endParaRPr lang="en-US" sz="1800" dirty="0" smtClean="0"/>
           </a:p>
           <a:p>
             <a:pPr marL="457200" indent="-457200">
@@ -7642,7 +8336,7 @@
                 <a:spcPct val="90000"/>
               </a:lnSpc>
             </a:pPr>
-            <a:endParaRPr lang="en-US" sz="2000" smtClean="0"/>
+            <a:endParaRPr lang="en-US" sz="2000" dirty="0" smtClean="0"/>
           </a:p>
         </p:txBody>
       </p:sp>

</xml_diff>